<commit_message>
checked summary grammar and added alt text to ppt
</commit_message>
<xml_diff>
--- a/presentation/women-in-workforce.pptx
+++ b/presentation/women-in-workforce.pptx
@@ -11,8 +11,8 @@
     <p:sldId id="275" r:id="rId5"/>
     <p:sldId id="273" r:id="rId6"/>
     <p:sldId id="267" r:id="rId7"/>
-    <p:sldId id="277" r:id="rId8"/>
-    <p:sldId id="278" r:id="rId9"/>
+    <p:sldId id="280" r:id="rId8"/>
+    <p:sldId id="281" r:id="rId9"/>
     <p:sldId id="279" r:id="rId10"/>
     <p:sldId id="258" r:id="rId11"/>
     <p:sldId id="260" r:id="rId12"/>
@@ -6928,8 +6928,8 @@
         </p:nvSpPr>
         <p:spPr>
           <a:xfrm>
-            <a:off x="1580257" y="864911"/>
-            <a:ext cx="9031484" cy="3467282"/>
+            <a:off x="1580256" y="738461"/>
+            <a:ext cx="9031484" cy="2401792"/>
           </a:xfrm>
         </p:spPr>
         <p:txBody>
@@ -9093,7 +9093,7 @@
         </p:nvSpPr>
         <p:spPr>
           <a:xfrm>
-            <a:off x="2073314" y="5493376"/>
+            <a:off x="2073311" y="3660476"/>
             <a:ext cx="8045373" cy="742279"/>
           </a:xfrm>
         </p:spPr>
@@ -9120,6 +9120,292 @@
                 </a:solidFill>
               </a:rPr>
               <a:t>women in the workforce?</a:t>
+            </a:r>
+          </a:p>
+        </p:txBody>
+      </p:sp>
+      <p:sp>
+        <p:nvSpPr>
+          <p:cNvPr id="6" name="Subtitle 2">
+            <a:extLst>
+              <a:ext uri="{FF2B5EF4-FFF2-40B4-BE49-F238E27FC236}">
+                <a16:creationId xmlns:a16="http://schemas.microsoft.com/office/drawing/2014/main" id="{83418050-D711-4EF7-976F-18D15426F9D1}"/>
+              </a:ext>
+            </a:extLst>
+          </p:cNvPr>
+          <p:cNvSpPr txBox="1">
+            <a:spLocks/>
+          </p:cNvSpPr>
+          <p:nvPr/>
+        </p:nvSpPr>
+        <p:spPr>
+          <a:xfrm>
+            <a:off x="71120" y="5593213"/>
+            <a:ext cx="12120880" cy="742279"/>
+          </a:xfrm>
+          <a:prstGeom prst="rect">
+            <a:avLst/>
+          </a:prstGeom>
+        </p:spPr>
+        <p:txBody>
+          <a:bodyPr vert="horz" lIns="91440" tIns="45720" rIns="91440" bIns="45720" rtlCol="0" anchor="ctr">
+            <a:normAutofit/>
+          </a:bodyPr>
+          <a:lstStyle>
+            <a:lvl1pPr marL="0" indent="0" algn="ctr" defTabSz="914400" rtl="0" eaLnBrk="1" latinLnBrk="0" hangingPunct="1">
+              <a:lnSpc>
+                <a:spcPct val="100000"/>
+              </a:lnSpc>
+              <a:spcBef>
+                <a:spcPts val="700"/>
+              </a:spcBef>
+              <a:buClr>
+                <a:schemeClr val="tx2"/>
+              </a:buClr>
+              <a:buFont typeface="Arial" panose="020B0604020202020204" pitchFamily="34" charset="0"/>
+              <a:buNone/>
+              <a:defRPr sz="2000" b="1" i="0" kern="1200" cap="all" spc="400" baseline="0">
+                <a:solidFill>
+                  <a:schemeClr val="tx2"/>
+                </a:solidFill>
+                <a:latin typeface="+mn-lt"/>
+                <a:ea typeface="+mn-ea"/>
+                <a:cs typeface="+mn-cs"/>
+              </a:defRPr>
+            </a:lvl1pPr>
+            <a:lvl2pPr marL="457200" indent="0" algn="ctr" defTabSz="914400" rtl="0" eaLnBrk="1" latinLnBrk="0" hangingPunct="1">
+              <a:lnSpc>
+                <a:spcPct val="110000"/>
+              </a:lnSpc>
+              <a:spcBef>
+                <a:spcPts val="700"/>
+              </a:spcBef>
+              <a:buClr>
+                <a:schemeClr val="tx2"/>
+              </a:buClr>
+              <a:buFont typeface="Gill Sans MT" panose="020B0502020104020203" pitchFamily="34" charset="0"/>
+              <a:buNone/>
+              <a:defRPr sz="2000" kern="1200">
+                <a:solidFill>
+                  <a:schemeClr val="tx1">
+                    <a:lumMod val="65000"/>
+                    <a:lumOff val="35000"/>
+                  </a:schemeClr>
+                </a:solidFill>
+                <a:latin typeface="+mn-lt"/>
+                <a:ea typeface="+mn-ea"/>
+                <a:cs typeface="+mn-cs"/>
+              </a:defRPr>
+            </a:lvl2pPr>
+            <a:lvl3pPr marL="914400" indent="0" algn="ctr" defTabSz="914400" rtl="0" eaLnBrk="1" latinLnBrk="0" hangingPunct="1">
+              <a:lnSpc>
+                <a:spcPct val="110000"/>
+              </a:lnSpc>
+              <a:spcBef>
+                <a:spcPts val="700"/>
+              </a:spcBef>
+              <a:buClr>
+                <a:schemeClr val="tx2"/>
+              </a:buClr>
+              <a:buFont typeface="Arial" panose="020B0604020202020204" pitchFamily="34" charset="0"/>
+              <a:buNone/>
+              <a:defRPr sz="1800" kern="1200">
+                <a:solidFill>
+                  <a:schemeClr val="tx1">
+                    <a:lumMod val="65000"/>
+                    <a:lumOff val="35000"/>
+                  </a:schemeClr>
+                </a:solidFill>
+                <a:latin typeface="+mn-lt"/>
+                <a:ea typeface="+mn-ea"/>
+                <a:cs typeface="+mn-cs"/>
+              </a:defRPr>
+            </a:lvl3pPr>
+            <a:lvl4pPr marL="1371600" indent="0" algn="ctr" defTabSz="914400" rtl="0" eaLnBrk="1" latinLnBrk="0" hangingPunct="1">
+              <a:lnSpc>
+                <a:spcPct val="110000"/>
+              </a:lnSpc>
+              <a:spcBef>
+                <a:spcPts val="700"/>
+              </a:spcBef>
+              <a:buClr>
+                <a:schemeClr val="tx2"/>
+              </a:buClr>
+              <a:buFont typeface="Gill Sans MT" panose="020B0502020104020203" pitchFamily="34" charset="0"/>
+              <a:buNone/>
+              <a:defRPr sz="1600" kern="1200">
+                <a:solidFill>
+                  <a:schemeClr val="tx1">
+                    <a:lumMod val="65000"/>
+                    <a:lumOff val="35000"/>
+                  </a:schemeClr>
+                </a:solidFill>
+                <a:latin typeface="+mn-lt"/>
+                <a:ea typeface="+mn-ea"/>
+                <a:cs typeface="+mn-cs"/>
+              </a:defRPr>
+            </a:lvl4pPr>
+            <a:lvl5pPr marL="1828800" indent="0" algn="ctr" defTabSz="914400" rtl="0" eaLnBrk="1" latinLnBrk="0" hangingPunct="1">
+              <a:lnSpc>
+                <a:spcPct val="110000"/>
+              </a:lnSpc>
+              <a:spcBef>
+                <a:spcPts val="700"/>
+              </a:spcBef>
+              <a:buClr>
+                <a:schemeClr val="tx2"/>
+              </a:buClr>
+              <a:buFont typeface="Arial" panose="020B0604020202020204" pitchFamily="34" charset="0"/>
+              <a:buNone/>
+              <a:defRPr sz="1600" kern="1200">
+                <a:solidFill>
+                  <a:schemeClr val="tx1">
+                    <a:lumMod val="65000"/>
+                    <a:lumOff val="35000"/>
+                  </a:schemeClr>
+                </a:solidFill>
+                <a:latin typeface="+mn-lt"/>
+                <a:ea typeface="+mn-ea"/>
+                <a:cs typeface="+mn-cs"/>
+              </a:defRPr>
+            </a:lvl5pPr>
+            <a:lvl6pPr marL="2286000" indent="0" algn="ctr" defTabSz="914400" rtl="0" eaLnBrk="1" latinLnBrk="0" hangingPunct="1">
+              <a:lnSpc>
+                <a:spcPct val="110000"/>
+              </a:lnSpc>
+              <a:spcBef>
+                <a:spcPts val="700"/>
+              </a:spcBef>
+              <a:buClr>
+                <a:schemeClr val="tx2"/>
+              </a:buClr>
+              <a:buFont typeface="Gill Sans MT" panose="020B0502020104020203" pitchFamily="34" charset="0"/>
+              <a:buNone/>
+              <a:defRPr sz="1600" kern="1200">
+                <a:solidFill>
+                  <a:schemeClr val="tx1">
+                    <a:lumMod val="65000"/>
+                    <a:lumOff val="35000"/>
+                  </a:schemeClr>
+                </a:solidFill>
+                <a:latin typeface="+mn-lt"/>
+                <a:ea typeface="+mn-ea"/>
+                <a:cs typeface="+mn-cs"/>
+              </a:defRPr>
+            </a:lvl6pPr>
+            <a:lvl7pPr marL="2743200" indent="0" algn="ctr" defTabSz="914400" rtl="0" eaLnBrk="1" latinLnBrk="0" hangingPunct="1">
+              <a:lnSpc>
+                <a:spcPct val="110000"/>
+              </a:lnSpc>
+              <a:spcBef>
+                <a:spcPts val="700"/>
+              </a:spcBef>
+              <a:buClr>
+                <a:schemeClr val="tx2"/>
+              </a:buClr>
+              <a:buFont typeface="Arial" panose="020B0604020202020204" pitchFamily="34" charset="0"/>
+              <a:buNone/>
+              <a:defRPr sz="1600" kern="1200">
+                <a:solidFill>
+                  <a:schemeClr val="tx1">
+                    <a:lumMod val="65000"/>
+                    <a:lumOff val="35000"/>
+                  </a:schemeClr>
+                </a:solidFill>
+                <a:latin typeface="+mn-lt"/>
+                <a:ea typeface="+mn-ea"/>
+                <a:cs typeface="+mn-cs"/>
+              </a:defRPr>
+            </a:lvl7pPr>
+            <a:lvl8pPr marL="3200400" indent="0" algn="ctr" defTabSz="914400" rtl="0" eaLnBrk="1" latinLnBrk="0" hangingPunct="1">
+              <a:lnSpc>
+                <a:spcPct val="110000"/>
+              </a:lnSpc>
+              <a:spcBef>
+                <a:spcPts val="700"/>
+              </a:spcBef>
+              <a:buClr>
+                <a:schemeClr val="tx2"/>
+              </a:buClr>
+              <a:buFont typeface="Gill Sans MT" panose="020B0502020104020203" pitchFamily="34" charset="0"/>
+              <a:buNone/>
+              <a:defRPr sz="1600" kern="1200" baseline="0">
+                <a:solidFill>
+                  <a:schemeClr val="tx1">
+                    <a:lumMod val="65000"/>
+                    <a:lumOff val="35000"/>
+                  </a:schemeClr>
+                </a:solidFill>
+                <a:latin typeface="+mn-lt"/>
+                <a:ea typeface="+mn-ea"/>
+                <a:cs typeface="+mn-cs"/>
+              </a:defRPr>
+            </a:lvl8pPr>
+            <a:lvl9pPr marL="3657600" indent="0" algn="ctr" defTabSz="914400" rtl="0" eaLnBrk="1" latinLnBrk="0" hangingPunct="1">
+              <a:lnSpc>
+                <a:spcPct val="110000"/>
+              </a:lnSpc>
+              <a:spcBef>
+                <a:spcPts val="700"/>
+              </a:spcBef>
+              <a:buClr>
+                <a:schemeClr val="tx2"/>
+              </a:buClr>
+              <a:buFont typeface="Arial" panose="020B0604020202020204" pitchFamily="34" charset="0"/>
+              <a:buNone/>
+              <a:defRPr sz="1600" kern="1200" baseline="0">
+                <a:solidFill>
+                  <a:schemeClr val="tx1">
+                    <a:lumMod val="65000"/>
+                    <a:lumOff val="35000"/>
+                  </a:schemeClr>
+                </a:solidFill>
+                <a:latin typeface="+mn-lt"/>
+                <a:ea typeface="+mn-ea"/>
+                <a:cs typeface="+mn-cs"/>
+              </a:defRPr>
+            </a:lvl9pPr>
+          </a:lstStyle>
+          <a:p>
+            <a:r>
+              <a:rPr lang="en-US" sz="1800" dirty="0">
+                <a:solidFill>
+                  <a:srgbClr val="2A1A00"/>
+                </a:solidFill>
+              </a:rPr>
+              <a:t>Tamara Najjar, </a:t>
+            </a:r>
+            <a:r>
+              <a:rPr lang="en-US" sz="1800" dirty="0" err="1">
+                <a:solidFill>
+                  <a:srgbClr val="2A1A00"/>
+                </a:solidFill>
+              </a:rPr>
+              <a:t>mohammed</a:t>
+            </a:r>
+            <a:r>
+              <a:rPr lang="en-US" sz="1800" dirty="0">
+                <a:solidFill>
+                  <a:srgbClr val="2A1A00"/>
+                </a:solidFill>
+              </a:rPr>
+              <a:t> </a:t>
+            </a:r>
+            <a:r>
+              <a:rPr lang="en-US" sz="1800" dirty="0" err="1">
+                <a:solidFill>
+                  <a:srgbClr val="2A1A00"/>
+                </a:solidFill>
+              </a:rPr>
+              <a:t>sajid</a:t>
+            </a:r>
+            <a:r>
+              <a:rPr lang="en-US" sz="1800" dirty="0">
+                <a:solidFill>
+                  <a:srgbClr val="2A1A00"/>
+                </a:solidFill>
+              </a:rPr>
+              <a:t> khan, Kathleen graham </a:t>
             </a:r>
           </a:p>
         </p:txBody>
@@ -9287,7 +9573,7 @@
       </p:sp>
       <p:pic>
         <p:nvPicPr>
-          <p:cNvPr id="2054" name="Picture 6" descr="Related image">
+          <p:cNvPr id="2054" name="Picture 6" descr="women in business clothes with increase arrow in background">
             <a:extLst>
               <a:ext uri="{FF2B5EF4-FFF2-40B4-BE49-F238E27FC236}">
                 <a16:creationId xmlns:a16="http://schemas.microsoft.com/office/drawing/2014/main" id="{75BA90D4-1AAE-47E9-B304-301700C49BE5}"/>
@@ -9334,7 +9620,7 @@
       </p:pic>
       <p:pic>
         <p:nvPicPr>
-          <p:cNvPr id="2056" name="Picture 8" descr="Related image">
+          <p:cNvPr id="2056" name="Picture 8" descr="no crying baby allowed">
             <a:extLst>
               <a:ext uri="{FF2B5EF4-FFF2-40B4-BE49-F238E27FC236}">
                 <a16:creationId xmlns:a16="http://schemas.microsoft.com/office/drawing/2014/main" id="{E7959EA0-AA8F-4447-97AA-F2E28975A2F2}"/>
@@ -9507,7 +9793,7 @@
       </p:sp>
       <p:pic>
         <p:nvPicPr>
-          <p:cNvPr id="6" name="Picture 6">
+          <p:cNvPr id="6" name="Picture 6" descr="gdp growth by state from 1997-2018 plot">
             <a:extLst>
               <a:ext uri="{FF2B5EF4-FFF2-40B4-BE49-F238E27FC236}">
                 <a16:creationId xmlns:a16="http://schemas.microsoft.com/office/drawing/2014/main" id="{4075A3BD-3EF7-4D6D-BF50-96C9559F771B}"/>
@@ -9533,7 +9819,7 @@
         </p:blipFill>
         <p:spPr bwMode="auto">
           <a:xfrm>
-            <a:off x="860510" y="3309660"/>
+            <a:off x="860510" y="3357160"/>
             <a:ext cx="5821368" cy="3172644"/>
           </a:xfrm>
           <a:prstGeom prst="rect">
@@ -9553,7 +9839,7 @@
       </p:pic>
       <p:pic>
         <p:nvPicPr>
-          <p:cNvPr id="7170" name="Picture 2">
+          <p:cNvPr id="7170" name="Picture 2" descr="percentage of women in workforce vs gdp growth from 1960-2016 plot">
             <a:extLst>
               <a:ext uri="{FF2B5EF4-FFF2-40B4-BE49-F238E27FC236}">
                 <a16:creationId xmlns:a16="http://schemas.microsoft.com/office/drawing/2014/main" id="{35B80F5F-55AB-4086-98DC-7D88813647CB}"/>
@@ -9580,7 +9866,7 @@
         </p:blipFill>
         <p:spPr bwMode="auto">
           <a:xfrm>
-            <a:off x="860510" y="67919"/>
+            <a:off x="860510" y="145355"/>
             <a:ext cx="5821368" cy="2959004"/>
           </a:xfrm>
           <a:prstGeom prst="rect">
@@ -9600,10 +9886,10 @@
       </p:pic>
       <p:sp>
         <p:nvSpPr>
-          <p:cNvPr id="7" name="TextBox 6">
+          <p:cNvPr id="3" name="TextBox 2">
             <a:extLst>
               <a:ext uri="{FF2B5EF4-FFF2-40B4-BE49-F238E27FC236}">
-                <a16:creationId xmlns:a16="http://schemas.microsoft.com/office/drawing/2014/main" id="{2584B10A-0200-42B6-B716-1A555283B0ED}"/>
+                <a16:creationId xmlns:a16="http://schemas.microsoft.com/office/drawing/2014/main" id="{A4E10C2E-4737-45DE-A551-F9AE2071D3A7}"/>
               </a:ext>
             </a:extLst>
           </p:cNvPr>
@@ -9612,8 +9898,8 @@
         </p:nvSpPr>
         <p:spPr>
           <a:xfrm>
-            <a:off x="762000" y="6482304"/>
-            <a:ext cx="6465450" cy="261610"/>
+            <a:off x="4956205" y="3101133"/>
+            <a:ext cx="1884607" cy="276999"/>
           </a:xfrm>
           <a:prstGeom prst="rect">
             <a:avLst/>
@@ -9627,9 +9913,12 @@
           <a:lstStyle/>
           <a:p>
             <a:r>
-              <a:rPr lang="en-US" sz="1100" dirty="0"/>
-              <a:t>* Source: U.S. Department of Labor </a:t>
-            </a:r>
+              <a:rPr lang="en-US" sz="1200" dirty="0">
+                <a:hlinkClick r:id="rId4"/>
+              </a:rPr>
+              <a:t>https://fred.stlouisfed.org/</a:t>
+            </a:r>
+            <a:endParaRPr lang="en-US" sz="1200" dirty="0"/>
           </a:p>
         </p:txBody>
       </p:sp>
@@ -9638,7 +9927,7 @@
           <p:cNvPr id="8" name="TextBox 7">
             <a:extLst>
               <a:ext uri="{FF2B5EF4-FFF2-40B4-BE49-F238E27FC236}">
-                <a16:creationId xmlns:a16="http://schemas.microsoft.com/office/drawing/2014/main" id="{2F6DB27F-9085-43CC-AB71-8FCE7FA18A5C}"/>
+                <a16:creationId xmlns:a16="http://schemas.microsoft.com/office/drawing/2014/main" id="{27C27ABB-C322-45CD-832B-32CE0BC94326}"/>
               </a:ext>
             </a:extLst>
           </p:cNvPr>
@@ -9647,8 +9936,8 @@
         </p:nvSpPr>
         <p:spPr>
           <a:xfrm>
-            <a:off x="860510" y="2996406"/>
-            <a:ext cx="6465450" cy="261610"/>
+            <a:off x="4876738" y="6529804"/>
+            <a:ext cx="1884607" cy="276999"/>
           </a:xfrm>
           <a:prstGeom prst="rect">
             <a:avLst/>
@@ -9662,9 +9951,12 @@
           <a:lstStyle/>
           <a:p>
             <a:r>
-              <a:rPr lang="en-US" sz="1100" dirty="0"/>
-              <a:t>* Source: Federal Reserve Bank of St. Louis, Eighth District   </a:t>
-            </a:r>
+              <a:rPr lang="en-US" sz="1200" dirty="0">
+                <a:hlinkClick r:id="rId4"/>
+              </a:rPr>
+              <a:t>https://fred.stlouisfed.org/</a:t>
+            </a:r>
+            <a:endParaRPr lang="en-US" sz="1200" dirty="0"/>
           </a:p>
         </p:txBody>
       </p:sp>
@@ -9765,23 +10057,14 @@
           <a:p>
             <a:r>
               <a:rPr lang="en-US" dirty="0"/>
-              <a:t>But aren’t employees more expensive now? Yes, BUT...</a:t>
-            </a:r>
-          </a:p>
-          <a:p>
-            <a:endParaRPr lang="en-US" dirty="0"/>
-          </a:p>
-          <a:p>
-            <a:r>
-              <a:rPr lang="en-US" dirty="0"/>
-              <a:t>It doesn’t have a negative correlation.</a:t>
+              <a:t>But aren’t employees more expensive now? NO.</a:t>
             </a:r>
           </a:p>
         </p:txBody>
       </p:sp>
       <p:pic>
         <p:nvPicPr>
-          <p:cNvPr id="6" name="Picture 2">
+          <p:cNvPr id="6" name="Picture 2" descr="stock market and cost per employee from 1960-2018 plot">
             <a:extLst>
               <a:ext uri="{FF2B5EF4-FFF2-40B4-BE49-F238E27FC236}">
                 <a16:creationId xmlns:a16="http://schemas.microsoft.com/office/drawing/2014/main" id="{E29DC0D1-BC7D-41E1-B3AD-5D4A3547723E}"/>
@@ -9807,8 +10090,8 @@
         </p:blipFill>
         <p:spPr bwMode="auto">
           <a:xfrm>
-            <a:off x="920973" y="109683"/>
-            <a:ext cx="5784628" cy="3080314"/>
+            <a:off x="920973" y="109682"/>
+            <a:ext cx="5713584" cy="3042483"/>
           </a:xfrm>
           <a:prstGeom prst="rect">
             <a:avLst/>
@@ -9854,8 +10137,8 @@
         </p:blipFill>
         <p:spPr bwMode="auto">
           <a:xfrm>
-            <a:off x="920972" y="3440837"/>
-            <a:ext cx="5866291" cy="3152765"/>
+            <a:off x="920973" y="3429000"/>
+            <a:ext cx="5713584" cy="3070695"/>
           </a:xfrm>
           <a:prstGeom prst="rect">
             <a:avLst/>
@@ -9874,70 +10157,80 @@
       </p:pic>
       <p:sp>
         <p:nvSpPr>
-          <p:cNvPr id="7" name="TextBox 6">
+          <p:cNvPr id="2" name="Rectangle 1">
             <a:extLst>
               <a:ext uri="{FF2B5EF4-FFF2-40B4-BE49-F238E27FC236}">
-                <a16:creationId xmlns:a16="http://schemas.microsoft.com/office/drawing/2014/main" id="{77BCF26E-19E9-4D88-A3D9-8D28F2217EDF}"/>
+                <a16:creationId xmlns:a16="http://schemas.microsoft.com/office/drawing/2014/main" id="{817C5998-2D9A-43C0-B399-B3F4D822DB41}"/>
               </a:ext>
             </a:extLst>
           </p:cNvPr>
-          <p:cNvSpPr txBox="1"/>
+          <p:cNvSpPr/>
           <p:nvPr/>
         </p:nvSpPr>
         <p:spPr>
           <a:xfrm>
-            <a:off x="833120" y="6581001"/>
-            <a:ext cx="6465450" cy="261610"/>
+            <a:off x="5129260" y="3152001"/>
+            <a:ext cx="1618007" cy="276999"/>
           </a:xfrm>
           <a:prstGeom prst="rect">
             <a:avLst/>
           </a:prstGeom>
-          <a:noFill/>
         </p:spPr>
         <p:txBody>
-          <a:bodyPr wrap="square" rtlCol="0">
+          <a:bodyPr wrap="none">
             <a:spAutoFit/>
           </a:bodyPr>
           <a:lstStyle/>
           <a:p>
             <a:r>
-              <a:rPr lang="en-US" sz="1100" dirty="0"/>
-              <a:t>* Source: U.S. Department of Labor, Bureau of Labor Statistics</a:t>
+              <a:rPr lang="en-US" sz="1200" dirty="0">
+                <a:hlinkClick r:id="rId4"/>
+              </a:rPr>
+              <a:t>https://yhoo.it/2XJ4JvL</a:t>
+            </a:r>
+            <a:r>
+              <a:rPr lang="en-US" sz="1200" dirty="0"/>
+              <a:t> </a:t>
             </a:r>
           </a:p>
         </p:txBody>
       </p:sp>
       <p:sp>
         <p:nvSpPr>
-          <p:cNvPr id="8" name="TextBox 7">
+          <p:cNvPr id="5" name="Rectangle 4">
             <a:extLst>
               <a:ext uri="{FF2B5EF4-FFF2-40B4-BE49-F238E27FC236}">
-                <a16:creationId xmlns:a16="http://schemas.microsoft.com/office/drawing/2014/main" id="{6C8387E5-C2BD-4DC8-B84E-B332C8EFC02B}"/>
+                <a16:creationId xmlns:a16="http://schemas.microsoft.com/office/drawing/2014/main" id="{65D53CAC-116D-418E-B917-E323BC3FC680}"/>
               </a:ext>
             </a:extLst>
           </p:cNvPr>
-          <p:cNvSpPr txBox="1"/>
+          <p:cNvSpPr/>
           <p:nvPr/>
         </p:nvSpPr>
         <p:spPr>
           <a:xfrm>
-            <a:off x="833120" y="3155553"/>
-            <a:ext cx="6465450" cy="261610"/>
+            <a:off x="5095596" y="6503454"/>
+            <a:ext cx="1685333" cy="276999"/>
           </a:xfrm>
           <a:prstGeom prst="rect">
             <a:avLst/>
           </a:prstGeom>
-          <a:noFill/>
         </p:spPr>
         <p:txBody>
-          <a:bodyPr wrap="square" rtlCol="0">
+          <a:bodyPr wrap="none">
             <a:spAutoFit/>
           </a:bodyPr>
           <a:lstStyle/>
           <a:p>
             <a:r>
-              <a:rPr lang="en-US" sz="1100" dirty="0"/>
-              <a:t>* Source: Yahoo Finance </a:t>
+              <a:rPr lang="en-US" sz="1200" dirty="0">
+                <a:hlinkClick r:id="rId5"/>
+              </a:rPr>
+              <a:t>https://catalog.data.gov/</a:t>
+            </a:r>
+            <a:r>
+              <a:rPr lang="en-US" sz="1200" dirty="0"/>
+              <a:t> </a:t>
             </a:r>
           </a:p>
         </p:txBody>
@@ -10093,7 +10386,7 @@
       </p:sp>
       <p:pic>
         <p:nvPicPr>
-          <p:cNvPr id="5122" name="Picture 2">
+          <p:cNvPr id="5122" name="Picture 2" descr="crude birth rate from 1960-2016 plot">
             <a:extLst>
               <a:ext uri="{FF2B5EF4-FFF2-40B4-BE49-F238E27FC236}">
                 <a16:creationId xmlns:a16="http://schemas.microsoft.com/office/drawing/2014/main" id="{514471DD-4EB4-46A3-B9AF-8EADE261013C}"/>
@@ -10140,10 +10433,10 @@
       </p:pic>
       <p:sp>
         <p:nvSpPr>
-          <p:cNvPr id="6" name="TextBox 5">
+          <p:cNvPr id="5" name="TextBox 4">
             <a:extLst>
               <a:ext uri="{FF2B5EF4-FFF2-40B4-BE49-F238E27FC236}">
-                <a16:creationId xmlns:a16="http://schemas.microsoft.com/office/drawing/2014/main" id="{DD3A7BD2-1DF8-44BF-93AC-70AA1FB1EE2F}"/>
+                <a16:creationId xmlns:a16="http://schemas.microsoft.com/office/drawing/2014/main" id="{CE9CB5C9-19BD-42CE-B8E9-AEB10E23970A}"/>
               </a:ext>
             </a:extLst>
           </p:cNvPr>
@@ -10152,8 +10445,8 @@
         </p:nvSpPr>
         <p:spPr>
           <a:xfrm>
-            <a:off x="462438" y="5212918"/>
-            <a:ext cx="6465450" cy="261610"/>
+            <a:off x="5334341" y="5212918"/>
+            <a:ext cx="1884607" cy="276999"/>
           </a:xfrm>
           <a:prstGeom prst="rect">
             <a:avLst/>
@@ -10167,9 +10460,12 @@
           <a:lstStyle/>
           <a:p>
             <a:r>
-              <a:rPr lang="en-US" sz="1100" dirty="0"/>
-              <a:t>* Source: Federal Reserve Bank of St. Louis, Eighth District</a:t>
-            </a:r>
+              <a:rPr lang="en-US" sz="1200" dirty="0">
+                <a:hlinkClick r:id="rId3"/>
+              </a:rPr>
+              <a:t>https://fred.stlouisfed.org/</a:t>
+            </a:r>
+            <a:endParaRPr lang="en-US" sz="1200" dirty="0"/>
           </a:p>
         </p:txBody>
       </p:sp>
@@ -10291,7 +10587,7 @@
       </p:sp>
       <p:pic>
         <p:nvPicPr>
-          <p:cNvPr id="8" name="Picture 2">
+          <p:cNvPr id="8" name="Picture 2" descr="employment status of women in workforce by age of  youngest child from 1960-2016 plot">
             <a:extLst>
               <a:ext uri="{FF2B5EF4-FFF2-40B4-BE49-F238E27FC236}">
                 <a16:creationId xmlns:a16="http://schemas.microsoft.com/office/drawing/2014/main" id="{E4D65449-5011-4E82-A584-EBDF9AABF043}"/>
@@ -10318,8 +10614,8 @@
         </p:blipFill>
         <p:spPr bwMode="auto">
           <a:xfrm>
-            <a:off x="843280" y="3439441"/>
-            <a:ext cx="5878286" cy="3110283"/>
+            <a:off x="762000" y="3619403"/>
+            <a:ext cx="5673176" cy="3001756"/>
           </a:xfrm>
           <a:prstGeom prst="rect">
             <a:avLst/>
@@ -10338,7 +10634,7 @@
       </p:pic>
       <p:pic>
         <p:nvPicPr>
-          <p:cNvPr id="9" name="Picture 4">
+          <p:cNvPr id="9" name="Picture 4" descr="percentage of women in workforce by age of youngest child from 1960-2016 plot">
             <a:extLst>
               <a:ext uri="{FF2B5EF4-FFF2-40B4-BE49-F238E27FC236}">
                 <a16:creationId xmlns:a16="http://schemas.microsoft.com/office/drawing/2014/main" id="{15FCCD95-D72F-40FF-8E70-EAD7F998C67A}"/>
@@ -10365,8 +10661,8 @@
         </p:blipFill>
         <p:spPr bwMode="auto">
           <a:xfrm>
-            <a:off x="843280" y="96910"/>
-            <a:ext cx="5878286" cy="3321650"/>
+            <a:off x="762001" y="128315"/>
+            <a:ext cx="5673176" cy="3205749"/>
           </a:xfrm>
           <a:prstGeom prst="rect">
             <a:avLst/>
@@ -10432,10 +10728,10 @@
       </p:pic>
       <p:sp>
         <p:nvSpPr>
-          <p:cNvPr id="10" name="TextBox 9">
+          <p:cNvPr id="7" name="TextBox 6">
             <a:extLst>
               <a:ext uri="{FF2B5EF4-FFF2-40B4-BE49-F238E27FC236}">
-                <a16:creationId xmlns:a16="http://schemas.microsoft.com/office/drawing/2014/main" id="{32E387D6-8C51-46F0-B716-0FD24745663D}"/>
+                <a16:creationId xmlns:a16="http://schemas.microsoft.com/office/drawing/2014/main" id="{DBC8F8EC-DDCE-4F65-A81E-1D0533019EB2}"/>
               </a:ext>
             </a:extLst>
           </p:cNvPr>
@@ -10444,8 +10740,8 @@
         </p:nvSpPr>
         <p:spPr>
           <a:xfrm>
-            <a:off x="843280" y="6549724"/>
-            <a:ext cx="6465450" cy="261610"/>
+            <a:off x="4390314" y="3334064"/>
+            <a:ext cx="2198945" cy="276999"/>
           </a:xfrm>
           <a:prstGeom prst="rect">
             <a:avLst/>
@@ -10459,9 +10755,50 @@
           <a:lstStyle/>
           <a:p>
             <a:r>
-              <a:rPr lang="en-US" sz="1100" dirty="0"/>
-              <a:t>* Source: Institute for Women’s Policy Research</a:t>
-            </a:r>
+              <a:rPr lang="en-US" sz="1200" dirty="0">
+                <a:hlinkClick r:id="rId5"/>
+              </a:rPr>
+              <a:t>https://statusofwomendata.org/</a:t>
+            </a:r>
+            <a:endParaRPr lang="en-US" sz="1200" dirty="0"/>
+          </a:p>
+        </p:txBody>
+      </p:sp>
+      <p:sp>
+        <p:nvSpPr>
+          <p:cNvPr id="10" name="TextBox 9">
+            <a:extLst>
+              <a:ext uri="{FF2B5EF4-FFF2-40B4-BE49-F238E27FC236}">
+                <a16:creationId xmlns:a16="http://schemas.microsoft.com/office/drawing/2014/main" id="{9479318D-A89D-4A3C-825B-00A330AE1B0A}"/>
+              </a:ext>
+            </a:extLst>
+          </p:cNvPr>
+          <p:cNvSpPr txBox="1"/>
+          <p:nvPr/>
+        </p:nvSpPr>
+        <p:spPr>
+          <a:xfrm>
+            <a:off x="4390314" y="6591185"/>
+            <a:ext cx="2198945" cy="276999"/>
+          </a:xfrm>
+          <a:prstGeom prst="rect">
+            <a:avLst/>
+          </a:prstGeom>
+          <a:noFill/>
+        </p:spPr>
+        <p:txBody>
+          <a:bodyPr wrap="square" rtlCol="0">
+            <a:spAutoFit/>
+          </a:bodyPr>
+          <a:lstStyle/>
+          <a:p>
+            <a:r>
+              <a:rPr lang="en-US" sz="1200" dirty="0">
+                <a:hlinkClick r:id="rId5"/>
+              </a:rPr>
+              <a:t>https://statusofwomendata.org/</a:t>
+            </a:r>
+            <a:endParaRPr lang="en-US" sz="1200" dirty="0"/>
           </a:p>
         </p:txBody>
       </p:sp>
@@ -10583,7 +10920,7 @@
       </p:sp>
       <p:pic>
         <p:nvPicPr>
-          <p:cNvPr id="4098" name="Picture 2">
+          <p:cNvPr id="4098" name="Picture 2" descr="increase pet expenditure from 1960-2017 plot">
             <a:extLst>
               <a:ext uri="{FF2B5EF4-FFF2-40B4-BE49-F238E27FC236}">
                 <a16:creationId xmlns:a16="http://schemas.microsoft.com/office/drawing/2014/main" id="{073AF23F-1ACA-48A0-8861-DBADA6B26242}"/>
@@ -10630,10 +10967,10 @@
       </p:pic>
       <p:sp>
         <p:nvSpPr>
-          <p:cNvPr id="6" name="TextBox 5">
+          <p:cNvPr id="5" name="TextBox 4">
             <a:extLst>
               <a:ext uri="{FF2B5EF4-FFF2-40B4-BE49-F238E27FC236}">
-                <a16:creationId xmlns:a16="http://schemas.microsoft.com/office/drawing/2014/main" id="{1719DB5A-75A4-4C9C-8CEC-A148AF619834}"/>
+                <a16:creationId xmlns:a16="http://schemas.microsoft.com/office/drawing/2014/main" id="{50A95328-150C-444A-8103-698150886C01}"/>
               </a:ext>
             </a:extLst>
           </p:cNvPr>
@@ -10642,8 +10979,8 @@
         </p:nvSpPr>
         <p:spPr>
           <a:xfrm>
-            <a:off x="522312" y="5178967"/>
-            <a:ext cx="6465450" cy="261610"/>
+            <a:off x="5290721" y="5178967"/>
+            <a:ext cx="1884607" cy="276999"/>
           </a:xfrm>
           <a:prstGeom prst="rect">
             <a:avLst/>
@@ -10657,9 +10994,12 @@
           <a:lstStyle/>
           <a:p>
             <a:r>
-              <a:rPr lang="en-US" sz="1100" dirty="0"/>
-              <a:t>* Source: Federal Reserve Bank of St. Louis, Eighth District</a:t>
-            </a:r>
+              <a:rPr lang="en-US" sz="1200" dirty="0">
+                <a:hlinkClick r:id="rId3"/>
+              </a:rPr>
+              <a:t>https://fred.stlouisfed.org/</a:t>
+            </a:r>
+            <a:endParaRPr lang="en-US" sz="1200" dirty="0"/>
           </a:p>
         </p:txBody>
       </p:sp>
@@ -10695,7 +11035,7 @@
       </p:grpSpPr>
       <p:pic>
         <p:nvPicPr>
-          <p:cNvPr id="2" name="Picture 4" descr="Related image">
+          <p:cNvPr id="2" name="Picture 4" descr="parents cradling dog as if it is a baby">
             <a:extLst>
               <a:ext uri="{FF2B5EF4-FFF2-40B4-BE49-F238E27FC236}">
                 <a16:creationId xmlns:a16="http://schemas.microsoft.com/office/drawing/2014/main" id="{50FB8E6C-3AE1-40F0-A427-B1E4153B8754}"/>
@@ -10740,7 +11080,7 @@
       </p:pic>
       <p:pic>
         <p:nvPicPr>
-          <p:cNvPr id="3" name="Picture 2">
+          <p:cNvPr id="3" name="Picture 2" descr="screenshot of funny social media post comparing cost of children vs cost of pets">
             <a:extLst>
               <a:ext uri="{FF2B5EF4-FFF2-40B4-BE49-F238E27FC236}">
                 <a16:creationId xmlns:a16="http://schemas.microsoft.com/office/drawing/2014/main" id="{EDA148CC-EEDC-4DA7-B6E5-E4CC727FAD08}"/>
@@ -10948,23 +11288,7 @@
                   <a:schemeClr val="tx1"/>
                 </a:solidFill>
               </a:rPr>
-              <a:t>Explore additional functionality of python, pandas, </a:t>
-            </a:r>
-            <a:r>
-              <a:rPr lang="en-US" dirty="0" err="1">
-                <a:solidFill>
-                  <a:schemeClr val="tx1"/>
-                </a:solidFill>
-              </a:rPr>
-              <a:t>numpy</a:t>
-            </a:r>
-            <a:r>
-              <a:rPr lang="en-US" dirty="0">
-                <a:solidFill>
-                  <a:schemeClr val="tx1"/>
-                </a:solidFill>
-              </a:rPr>
-              <a:t>, matplotlib, and other libraries.</a:t>
+              <a:t>Explore additional functionality of Python, pandas, NumPy, Matplotlib, and other libraries.</a:t>
             </a:r>
           </a:p>
           <a:p>
@@ -11375,8 +11699,8 @@
         </p:nvSpPr>
         <p:spPr>
           <a:xfrm>
-            <a:off x="1251678" y="1834338"/>
-            <a:ext cx="6998549" cy="3189323"/>
+            <a:off x="1251678" y="1155032"/>
+            <a:ext cx="6998549" cy="5513900"/>
           </a:xfrm>
         </p:spPr>
         <p:txBody>
@@ -11424,7 +11748,7 @@
       </p:sp>
       <p:pic>
         <p:nvPicPr>
-          <p:cNvPr id="7" name="Picture 6">
+          <p:cNvPr id="7" name="Picture 6" descr="woman in business clothes">
             <a:extLst>
               <a:ext uri="{FF2B5EF4-FFF2-40B4-BE49-F238E27FC236}">
                 <a16:creationId xmlns:a16="http://schemas.microsoft.com/office/drawing/2014/main" id="{1C89B1D8-02B0-4D19-A817-3D69608C2CA5}"/>
@@ -11489,7 +11813,7 @@
       </p:grpSpPr>
       <p:pic>
         <p:nvPicPr>
-          <p:cNvPr id="2" name="Picture 2">
+          <p:cNvPr id="2" name="Picture 2" descr="percentage of women in workforce from 1960-2016 plot">
             <a:extLst>
               <a:ext uri="{FF2B5EF4-FFF2-40B4-BE49-F238E27FC236}">
                 <a16:creationId xmlns:a16="http://schemas.microsoft.com/office/drawing/2014/main" id="{86CC7549-5D4B-42F7-91E1-DE7B04B8EEDD}"/>
@@ -11516,7 +11840,7 @@
         </p:blipFill>
         <p:spPr bwMode="auto">
           <a:xfrm>
-            <a:off x="1418710" y="729408"/>
+            <a:off x="1317110" y="729408"/>
             <a:ext cx="9954223" cy="5399183"/>
           </a:xfrm>
           <a:prstGeom prst="rect">
@@ -11536,10 +11860,10 @@
       </p:pic>
       <p:sp>
         <p:nvSpPr>
-          <p:cNvPr id="3" name="TextBox 2">
+          <p:cNvPr id="4" name="TextBox 3">
             <a:extLst>
               <a:ext uri="{FF2B5EF4-FFF2-40B4-BE49-F238E27FC236}">
-                <a16:creationId xmlns:a16="http://schemas.microsoft.com/office/drawing/2014/main" id="{6EDD410B-9EBD-479D-88B5-988A1BD81B98}"/>
+                <a16:creationId xmlns:a16="http://schemas.microsoft.com/office/drawing/2014/main" id="{347C48FB-B042-499C-A23A-071244EC90D3}"/>
               </a:ext>
             </a:extLst>
           </p:cNvPr>
@@ -11548,8 +11872,8 @@
         </p:nvSpPr>
         <p:spPr>
           <a:xfrm>
-            <a:off x="1418710" y="6268720"/>
-            <a:ext cx="6465450" cy="261610"/>
+            <a:off x="9386726" y="6128591"/>
+            <a:ext cx="1884607" cy="276999"/>
           </a:xfrm>
           <a:prstGeom prst="rect">
             <a:avLst/>
@@ -11563,9 +11887,12 @@
           <a:lstStyle/>
           <a:p>
             <a:r>
-              <a:rPr lang="en-US" sz="1100" dirty="0"/>
-              <a:t>* Source: Federal Reserve Bank of St. Louis, Eighth District</a:t>
-            </a:r>
+              <a:rPr lang="en-US" sz="1200" dirty="0">
+                <a:hlinkClick r:id="rId3"/>
+              </a:rPr>
+              <a:t>https://fred.stlouisfed.org/</a:t>
+            </a:r>
+            <a:endParaRPr lang="en-US" sz="1200" dirty="0"/>
           </a:p>
         </p:txBody>
       </p:sp>
@@ -11673,7 +12000,7 @@
       </p:sp>
       <p:pic>
         <p:nvPicPr>
-          <p:cNvPr id="4098" name="Picture 2">
+          <p:cNvPr id="4098" name="Picture 2" descr="percentage of women in workforce  by age from 1948-2016 plot">
             <a:extLst>
               <a:ext uri="{FF2B5EF4-FFF2-40B4-BE49-F238E27FC236}">
                 <a16:creationId xmlns:a16="http://schemas.microsoft.com/office/drawing/2014/main" id="{6B4F66FC-01D8-42D2-95AD-616BD3307BA7}"/>
@@ -11700,8 +12027,8 @@
         </p:blipFill>
         <p:spPr bwMode="auto">
           <a:xfrm>
-            <a:off x="762001" y="52634"/>
-            <a:ext cx="5750560" cy="3119111"/>
+            <a:off x="863347" y="96004"/>
+            <a:ext cx="5619955" cy="3048271"/>
           </a:xfrm>
           <a:prstGeom prst="rect">
             <a:avLst/>
@@ -11720,7 +12047,7 @@
       </p:pic>
       <p:pic>
         <p:nvPicPr>
-          <p:cNvPr id="7" name="Picture 2">
+          <p:cNvPr id="7" name="Picture 2" descr="percentage of women in workforce by race from 1960-2016 plot">
             <a:extLst>
               <a:ext uri="{FF2B5EF4-FFF2-40B4-BE49-F238E27FC236}">
                 <a16:creationId xmlns:a16="http://schemas.microsoft.com/office/drawing/2014/main" id="{DD68DE3F-6BC4-40F9-A0DE-90251CCF0DD1}"/>
@@ -11747,8 +12074,8 @@
         </p:blipFill>
         <p:spPr bwMode="auto">
           <a:xfrm>
-            <a:off x="762000" y="3267469"/>
-            <a:ext cx="5750560" cy="3119111"/>
+            <a:off x="863346" y="3429000"/>
+            <a:ext cx="5619956" cy="3048272"/>
           </a:xfrm>
           <a:prstGeom prst="rect">
             <a:avLst/>
@@ -11767,10 +12094,10 @@
       </p:pic>
       <p:sp>
         <p:nvSpPr>
-          <p:cNvPr id="6" name="TextBox 5">
+          <p:cNvPr id="3" name="TextBox 2">
             <a:extLst>
               <a:ext uri="{FF2B5EF4-FFF2-40B4-BE49-F238E27FC236}">
-                <a16:creationId xmlns:a16="http://schemas.microsoft.com/office/drawing/2014/main" id="{8198F278-2C5B-4C18-9200-151B9837889E}"/>
+                <a16:creationId xmlns:a16="http://schemas.microsoft.com/office/drawing/2014/main" id="{D154945F-8A92-4E76-A089-A7134C386FC8}"/>
               </a:ext>
             </a:extLst>
           </p:cNvPr>
@@ -11779,8 +12106,8 @@
         </p:nvSpPr>
         <p:spPr>
           <a:xfrm>
-            <a:off x="762000" y="6482304"/>
-            <a:ext cx="6465450" cy="261610"/>
+            <a:off x="4408110" y="3144275"/>
+            <a:ext cx="2198945" cy="276999"/>
           </a:xfrm>
           <a:prstGeom prst="rect">
             <a:avLst/>
@@ -11794,9 +12121,50 @@
           <a:lstStyle/>
           <a:p>
             <a:r>
-              <a:rPr lang="en-US" sz="1100" dirty="0"/>
-              <a:t>* Source: Institute for Women’s Policy Research</a:t>
-            </a:r>
+              <a:rPr lang="en-US" sz="1200" dirty="0">
+                <a:hlinkClick r:id="rId4"/>
+              </a:rPr>
+              <a:t>https://statusofwomendata.org/</a:t>
+            </a:r>
+            <a:endParaRPr lang="en-US" sz="1200" dirty="0"/>
+          </a:p>
+        </p:txBody>
+      </p:sp>
+      <p:sp>
+        <p:nvSpPr>
+          <p:cNvPr id="8" name="TextBox 7">
+            <a:extLst>
+              <a:ext uri="{FF2B5EF4-FFF2-40B4-BE49-F238E27FC236}">
+                <a16:creationId xmlns:a16="http://schemas.microsoft.com/office/drawing/2014/main" id="{CDC0F40A-2A89-4297-8274-F17CCC6976D0}"/>
+              </a:ext>
+            </a:extLst>
+          </p:cNvPr>
+          <p:cNvSpPr txBox="1"/>
+          <p:nvPr/>
+        </p:nvSpPr>
+        <p:spPr>
+          <a:xfrm>
+            <a:off x="4408110" y="6484998"/>
+            <a:ext cx="2198945" cy="276999"/>
+          </a:xfrm>
+          <a:prstGeom prst="rect">
+            <a:avLst/>
+          </a:prstGeom>
+          <a:noFill/>
+        </p:spPr>
+        <p:txBody>
+          <a:bodyPr wrap="square" rtlCol="0">
+            <a:spAutoFit/>
+          </a:bodyPr>
+          <a:lstStyle/>
+          <a:p>
+            <a:r>
+              <a:rPr lang="en-US" sz="1200" dirty="0">
+                <a:hlinkClick r:id="rId4"/>
+              </a:rPr>
+              <a:t>https://statusofwomendata.org/</a:t>
+            </a:r>
+            <a:endParaRPr lang="en-US" sz="1200" dirty="0"/>
           </a:p>
         </p:txBody>
       </p:sp>
@@ -11912,7 +12280,7 @@
             </a:r>
             <a:r>
               <a:rPr lang="en-US" dirty="0"/>
-              <a:t> (Federal Reserve Bank of St. Louis, Eighth District)</a:t>
+              <a:t> (Federal Reserve Bank of St. Louis, Eight District)</a:t>
             </a:r>
           </a:p>
           <a:p>
@@ -12478,7 +12846,7 @@
       </p:sp>
       <p:pic>
         <p:nvPicPr>
-          <p:cNvPr id="1026" name="Picture 2" descr="The Python Graph Gallery">
+          <p:cNvPr id="1026" name="Picture 2" descr="The Python Graph Gallery logo">
             <a:hlinkClick r:id="rId2"/>
             <a:extLst>
               <a:ext uri="{FF2B5EF4-FFF2-40B4-BE49-F238E27FC236}">
@@ -12526,7 +12894,7 @@
       </p:pic>
       <p:pic>
         <p:nvPicPr>
-          <p:cNvPr id="1028" name="Picture 4" descr="Image result for stack overflow">
+          <p:cNvPr id="1028" name="Picture 4" descr="stack overflow logo">
             <a:extLst>
               <a:ext uri="{FF2B5EF4-FFF2-40B4-BE49-F238E27FC236}">
                 <a16:creationId xmlns:a16="http://schemas.microsoft.com/office/drawing/2014/main" id="{9F9D60DE-4C62-465C-805E-6F2ED83E43E4}"/>
@@ -12573,7 +12941,7 @@
       </p:pic>
       <p:pic>
         <p:nvPicPr>
-          <p:cNvPr id="1030" name="Picture 6" descr="Image result for matplotlib">
+          <p:cNvPr id="1030" name="Picture 6" descr="matplotlib logo">
             <a:extLst>
               <a:ext uri="{FF2B5EF4-FFF2-40B4-BE49-F238E27FC236}">
                 <a16:creationId xmlns:a16="http://schemas.microsoft.com/office/drawing/2014/main" id="{DAECDCBA-0D45-463E-93E0-78571AC38A16}"/>
@@ -12620,7 +12988,7 @@
       </p:pic>
       <p:pic>
         <p:nvPicPr>
-          <p:cNvPr id="5" name="Picture 4">
+          <p:cNvPr id="5" name="Picture 4" descr="geeks for geeks logo">
             <a:extLst>
               <a:ext uri="{FF2B5EF4-FFF2-40B4-BE49-F238E27FC236}">
                 <a16:creationId xmlns:a16="http://schemas.microsoft.com/office/drawing/2014/main" id="{CDDC0FD7-8B8A-4BA3-924E-9326FC387AA0}"/>
@@ -12656,7 +13024,7 @@
     </p:spTree>
     <p:extLst>
       <p:ext uri="{BB962C8B-B14F-4D97-AF65-F5344CB8AC3E}">
-        <p14:creationId xmlns:p14="http://schemas.microsoft.com/office/powerpoint/2010/main" val="1416275128"/>
+        <p14:creationId xmlns:p14="http://schemas.microsoft.com/office/powerpoint/2010/main" val="3771703278"/>
       </p:ext>
     </p:extLst>
   </p:cSld>
@@ -12999,7 +13367,7 @@
       </p:sp>
       <p:pic>
         <p:nvPicPr>
-          <p:cNvPr id="7" name="Picture 6" descr="A screenshot of a cell phone&#10;&#10;Description automatically generated">
+          <p:cNvPr id="7" name="Picture 6" descr="screenshot of code for plotting women in workforce by race">
             <a:extLst>
               <a:ext uri="{FF2B5EF4-FFF2-40B4-BE49-F238E27FC236}">
                 <a16:creationId xmlns:a16="http://schemas.microsoft.com/office/drawing/2014/main" id="{BC7F4334-D234-4D25-B5B5-AD28129A5224}"/>
@@ -13025,8 +13393,8 @@
         </p:blipFill>
         <p:spPr>
           <a:xfrm>
-            <a:off x="1554641" y="2114550"/>
-            <a:ext cx="6742363" cy="4530273"/>
+            <a:off x="1149836" y="1880594"/>
+            <a:ext cx="5992643" cy="4764229"/>
           </a:xfrm>
           <a:prstGeom prst="rect">
             <a:avLst/>
@@ -13326,10 +13694,10 @@
       </p:sp>
       <p:pic>
         <p:nvPicPr>
-          <p:cNvPr id="6" name="Picture 5" descr="A screenshot of a social media post&#10;&#10;Description automatically generated">
+          <p:cNvPr id="4" name="Picture 3" descr="screenshot of parsing through dates to extract years in python and pandas">
             <a:extLst>
               <a:ext uri="{FF2B5EF4-FFF2-40B4-BE49-F238E27FC236}">
-                <a16:creationId xmlns:a16="http://schemas.microsoft.com/office/drawing/2014/main" id="{8A4F82E2-EA38-4CE0-941C-0A1CECC72F2D}"/>
+                <a16:creationId xmlns:a16="http://schemas.microsoft.com/office/drawing/2014/main" id="{CCF5EFAE-CE48-4734-AF9F-0AF860B1CE52}"/>
               </a:ext>
             </a:extLst>
           </p:cNvPr>
@@ -13352,8 +13720,8 @@
         </p:blipFill>
         <p:spPr>
           <a:xfrm>
-            <a:off x="7012638" y="1880594"/>
-            <a:ext cx="4559523" cy="3332939"/>
+            <a:off x="6315490" y="1686560"/>
+            <a:ext cx="5817963" cy="3926738"/>
           </a:xfrm>
           <a:prstGeom prst="rect">
             <a:avLst/>
@@ -13363,7 +13731,7 @@
     </p:spTree>
     <p:extLst>
       <p:ext uri="{BB962C8B-B14F-4D97-AF65-F5344CB8AC3E}">
-        <p14:creationId xmlns:p14="http://schemas.microsoft.com/office/powerpoint/2010/main" val="1728944104"/>
+        <p14:creationId xmlns:p14="http://schemas.microsoft.com/office/powerpoint/2010/main" val="2197917648"/>
       </p:ext>
     </p:extLst>
   </p:cSld>
@@ -13392,7 +13760,7 @@
       </p:grpSpPr>
       <p:pic>
         <p:nvPicPr>
-          <p:cNvPr id="3" name="Picture 2">
+          <p:cNvPr id="3" name="Picture 2" descr="comparison of crude data from women in workforce data set 1960-2016">
             <a:extLst>
               <a:ext uri="{FF2B5EF4-FFF2-40B4-BE49-F238E27FC236}">
                 <a16:creationId xmlns:a16="http://schemas.microsoft.com/office/drawing/2014/main" id="{47B9795F-9BDA-4F41-9C59-4DBAB7E0A4EB}"/>
@@ -14007,7 +14375,7 @@
       </p:sp>
       <p:pic>
         <p:nvPicPr>
-          <p:cNvPr id="6" name="Picture 2">
+          <p:cNvPr id="6" name="Picture 2" descr="percentage of women in workforce vs gdp growth from 1960-2016 plot">
             <a:extLst>
               <a:ext uri="{FF2B5EF4-FFF2-40B4-BE49-F238E27FC236}">
                 <a16:creationId xmlns:a16="http://schemas.microsoft.com/office/drawing/2014/main" id="{5B53275F-6D76-4D48-AA72-C3948DEF4500}"/>
@@ -14309,6 +14677,158 @@
               </a:rPr>
               <a:t>Plotting a secondary y axis with separate legends:</a:t>
             </a:r>
+          </a:p>
+        </p:txBody>
+      </p:sp>
+      <p:sp>
+        <p:nvSpPr>
+          <p:cNvPr id="8" name="TextBox 7">
+            <a:extLst>
+              <a:ext uri="{FF2B5EF4-FFF2-40B4-BE49-F238E27FC236}">
+                <a16:creationId xmlns:a16="http://schemas.microsoft.com/office/drawing/2014/main" id="{1267B8FD-1F8D-48AC-BE8A-27A0FCBEF9FA}"/>
+              </a:ext>
+            </a:extLst>
+          </p:cNvPr>
+          <p:cNvSpPr txBox="1"/>
+          <p:nvPr/>
+        </p:nvSpPr>
+        <p:spPr>
+          <a:xfrm>
+            <a:off x="9633456" y="4236438"/>
+            <a:ext cx="2198945" cy="276999"/>
+          </a:xfrm>
+          <a:prstGeom prst="rect">
+            <a:avLst/>
+          </a:prstGeom>
+          <a:noFill/>
+        </p:spPr>
+        <p:txBody>
+          <a:bodyPr wrap="square" rtlCol="0">
+            <a:spAutoFit/>
+          </a:bodyPr>
+          <a:lstStyle/>
+          <a:p>
+            <a:r>
+              <a:rPr lang="en-US" sz="1200" dirty="0">
+                <a:hlinkClick r:id="rId4"/>
+              </a:rPr>
+              <a:t>https://statusofwomendata.org/</a:t>
+            </a:r>
+            <a:endParaRPr lang="en-US" sz="1200" dirty="0"/>
+          </a:p>
+        </p:txBody>
+      </p:sp>
+      <p:sp>
+        <p:nvSpPr>
+          <p:cNvPr id="9" name="TextBox 8">
+            <a:extLst>
+              <a:ext uri="{FF2B5EF4-FFF2-40B4-BE49-F238E27FC236}">
+                <a16:creationId xmlns:a16="http://schemas.microsoft.com/office/drawing/2014/main" id="{F39D27C5-B05C-4BE5-A96F-CAFD59AB6E35}"/>
+              </a:ext>
+            </a:extLst>
+          </p:cNvPr>
+          <p:cNvSpPr txBox="1"/>
+          <p:nvPr/>
+        </p:nvSpPr>
+        <p:spPr>
+          <a:xfrm>
+            <a:off x="9947794" y="4437138"/>
+            <a:ext cx="1884607" cy="276999"/>
+          </a:xfrm>
+          <a:prstGeom prst="rect">
+            <a:avLst/>
+          </a:prstGeom>
+          <a:noFill/>
+        </p:spPr>
+        <p:txBody>
+          <a:bodyPr wrap="square" rtlCol="0">
+            <a:spAutoFit/>
+          </a:bodyPr>
+          <a:lstStyle/>
+          <a:p>
+            <a:r>
+              <a:rPr lang="en-US" sz="1200" dirty="0">
+                <a:hlinkClick r:id="rId5"/>
+              </a:rPr>
+              <a:t>https://fred.stlouisfed.org/</a:t>
+            </a:r>
+            <a:endParaRPr lang="en-US" sz="1200" dirty="0"/>
+          </a:p>
+        </p:txBody>
+      </p:sp>
+      <p:sp>
+        <p:nvSpPr>
+          <p:cNvPr id="10" name="TextBox 9">
+            <a:extLst>
+              <a:ext uri="{FF2B5EF4-FFF2-40B4-BE49-F238E27FC236}">
+                <a16:creationId xmlns:a16="http://schemas.microsoft.com/office/drawing/2014/main" id="{F4404CDB-0E8B-434D-BEE7-5FA228DFF9C1}"/>
+              </a:ext>
+            </a:extLst>
+          </p:cNvPr>
+          <p:cNvSpPr txBox="1"/>
+          <p:nvPr/>
+        </p:nvSpPr>
+        <p:spPr>
+          <a:xfrm>
+            <a:off x="4458277" y="4437139"/>
+            <a:ext cx="1884607" cy="276999"/>
+          </a:xfrm>
+          <a:prstGeom prst="rect">
+            <a:avLst/>
+          </a:prstGeom>
+          <a:noFill/>
+        </p:spPr>
+        <p:txBody>
+          <a:bodyPr wrap="square" rtlCol="0">
+            <a:spAutoFit/>
+          </a:bodyPr>
+          <a:lstStyle/>
+          <a:p>
+            <a:r>
+              <a:rPr lang="en-US" sz="1200" dirty="0">
+                <a:hlinkClick r:id="rId5"/>
+              </a:rPr>
+              <a:t>https://fred.stlouisfed.org/</a:t>
+            </a:r>
+            <a:endParaRPr lang="en-US" sz="1200" dirty="0"/>
+          </a:p>
+        </p:txBody>
+      </p:sp>
+      <p:sp>
+        <p:nvSpPr>
+          <p:cNvPr id="11" name="TextBox 10">
+            <a:extLst>
+              <a:ext uri="{FF2B5EF4-FFF2-40B4-BE49-F238E27FC236}">
+                <a16:creationId xmlns:a16="http://schemas.microsoft.com/office/drawing/2014/main" id="{38B7ACBF-60D4-4A22-950D-DA00A7CA8464}"/>
+              </a:ext>
+            </a:extLst>
+          </p:cNvPr>
+          <p:cNvSpPr txBox="1"/>
+          <p:nvPr/>
+        </p:nvSpPr>
+        <p:spPr>
+          <a:xfrm>
+            <a:off x="4129057" y="4236438"/>
+            <a:ext cx="2198945" cy="276999"/>
+          </a:xfrm>
+          <a:prstGeom prst="rect">
+            <a:avLst/>
+          </a:prstGeom>
+          <a:noFill/>
+        </p:spPr>
+        <p:txBody>
+          <a:bodyPr wrap="square" rtlCol="0">
+            <a:spAutoFit/>
+          </a:bodyPr>
+          <a:lstStyle/>
+          <a:p>
+            <a:r>
+              <a:rPr lang="en-US" sz="1200" dirty="0">
+                <a:hlinkClick r:id="rId4"/>
+              </a:rPr>
+              <a:t>https://statusofwomendata.org/</a:t>
+            </a:r>
+            <a:endParaRPr lang="en-US" sz="1200" dirty="0"/>
           </a:p>
         </p:txBody>
       </p:sp>

</xml_diff>

<commit_message>
update google slide link in readme
</commit_message>
<xml_diff>
--- a/presentation/women-in-workforce.pptx
+++ b/presentation/women-in-workforce.pptx
@@ -10346,7 +10346,7 @@
             <a:pPr algn="just"/>
             <a:r>
               <a:rPr lang="en-US" sz="1800" dirty="0"/>
-              <a:t>Though there maybe other contributing factors, women in the workforce is one of them.</a:t>
+              <a:t>Though there may be other contributing factors, women in the workforce is one of them.</a:t>
             </a:r>
           </a:p>
           <a:p>
@@ -11338,7 +11338,7 @@
                   <a:schemeClr val="tx1"/>
                 </a:solidFill>
               </a:rPr>
-              <a:t>Explore additional effects of increased women in the work place (i.e. divorce rates, average age of women at marriage, etc.)</a:t>
+              <a:t>Explore additional effects of increased women in the workplace (i.e. divorce rates, average age of women at marriage, etc.)</a:t>
             </a:r>
           </a:p>
           <a:p>
@@ -11348,7 +11348,7 @@
                   <a:schemeClr val="tx1"/>
                 </a:solidFill>
               </a:rPr>
-              <a:t>Explore if there are any contributing health factors to increased women in the work place (i.e. mental health, physical health, etc.)</a:t>
+              <a:t>Explore if there are any contributing health factors to increased women in the workplace (i.e. mental health, physical health, etc.)</a:t>
             </a:r>
           </a:p>
           <a:p>
@@ -11699,8 +11699,8 @@
         </p:nvSpPr>
         <p:spPr>
           <a:xfrm>
-            <a:off x="1251678" y="1155032"/>
-            <a:ext cx="6998549" cy="5513900"/>
+            <a:off x="1251678" y="1612232"/>
+            <a:ext cx="6998549" cy="3295048"/>
           </a:xfrm>
         </p:spPr>
         <p:txBody>

</xml_diff>

<commit_message>
updated one presentation slide
</commit_message>
<xml_diff>
--- a/presentation/women-in-workforce.pptx
+++ b/presentation/women-in-workforce.pptx
@@ -1340,7 +1340,7 @@
           <a:p>
             <a:fld id="{29724674-2547-4321-A0AF-0F5B55AD8D3B}" type="datetimeFigureOut">
               <a:rPr lang="en-US" smtClean="0"/>
-              <a:t>7/5/2019</a:t>
+              <a:t>7/6/2019</a:t>
             </a:fld>
             <a:endParaRPr lang="en-US"/>
           </a:p>
@@ -1578,7 +1578,7 @@
           <a:p>
             <a:fld id="{29724674-2547-4321-A0AF-0F5B55AD8D3B}" type="datetimeFigureOut">
               <a:rPr lang="en-US" smtClean="0"/>
-              <a:t>7/5/2019</a:t>
+              <a:t>7/6/2019</a:t>
             </a:fld>
             <a:endParaRPr lang="en-US"/>
           </a:p>
@@ -1758,7 +1758,7 @@
           <a:p>
             <a:fld id="{29724674-2547-4321-A0AF-0F5B55AD8D3B}" type="datetimeFigureOut">
               <a:rPr lang="en-US" smtClean="0"/>
-              <a:t>7/5/2019</a:t>
+              <a:t>7/6/2019</a:t>
             </a:fld>
             <a:endParaRPr lang="en-US"/>
           </a:p>
@@ -1928,7 +1928,7 @@
           <a:p>
             <a:fld id="{29724674-2547-4321-A0AF-0F5B55AD8D3B}" type="datetimeFigureOut">
               <a:rPr lang="en-US" smtClean="0"/>
-              <a:t>7/5/2019</a:t>
+              <a:t>7/6/2019</a:t>
             </a:fld>
             <a:endParaRPr lang="en-US"/>
           </a:p>
@@ -2204,7 +2204,7 @@
           <a:p>
             <a:fld id="{29724674-2547-4321-A0AF-0F5B55AD8D3B}" type="datetimeFigureOut">
               <a:rPr lang="en-US" smtClean="0"/>
-              <a:t>7/5/2019</a:t>
+              <a:t>7/6/2019</a:t>
             </a:fld>
             <a:endParaRPr lang="en-US"/>
           </a:p>
@@ -3405,7 +3405,7 @@
           <a:p>
             <a:fld id="{29724674-2547-4321-A0AF-0F5B55AD8D3B}" type="datetimeFigureOut">
               <a:rPr lang="en-US" smtClean="0"/>
-              <a:t>7/5/2019</a:t>
+              <a:t>7/6/2019</a:t>
             </a:fld>
             <a:endParaRPr lang="en-US"/>
           </a:p>
@@ -3795,7 +3795,7 @@
           <a:p>
             <a:fld id="{29724674-2547-4321-A0AF-0F5B55AD8D3B}" type="datetimeFigureOut">
               <a:rPr lang="en-US" smtClean="0"/>
-              <a:t>7/5/2019</a:t>
+              <a:t>7/6/2019</a:t>
             </a:fld>
             <a:endParaRPr lang="en-US"/>
           </a:p>
@@ -3918,7 +3918,7 @@
           <a:p>
             <a:fld id="{29724674-2547-4321-A0AF-0F5B55AD8D3B}" type="datetimeFigureOut">
               <a:rPr lang="en-US" smtClean="0"/>
-              <a:t>7/5/2019</a:t>
+              <a:t>7/6/2019</a:t>
             </a:fld>
             <a:endParaRPr lang="en-US"/>
           </a:p>
@@ -4013,7 +4013,7 @@
           <a:p>
             <a:fld id="{29724674-2547-4321-A0AF-0F5B55AD8D3B}" type="datetimeFigureOut">
               <a:rPr lang="en-US" smtClean="0"/>
-              <a:t>7/5/2019</a:t>
+              <a:t>7/6/2019</a:t>
             </a:fld>
             <a:endParaRPr lang="en-US"/>
           </a:p>
@@ -4776,7 +4776,7 @@
           <a:p>
             <a:fld id="{29724674-2547-4321-A0AF-0F5B55AD8D3B}" type="datetimeFigureOut">
               <a:rPr lang="en-US" smtClean="0"/>
-              <a:t>7/5/2019</a:t>
+              <a:t>7/6/2019</a:t>
             </a:fld>
             <a:endParaRPr lang="en-US"/>
           </a:p>
@@ -5616,7 +5616,7 @@
           <a:p>
             <a:fld id="{29724674-2547-4321-A0AF-0F5B55AD8D3B}" type="datetimeFigureOut">
               <a:rPr lang="en-US" smtClean="0"/>
-              <a:t>7/5/2019</a:t>
+              <a:t>7/6/2019</a:t>
             </a:fld>
             <a:endParaRPr lang="en-US"/>
           </a:p>
@@ -5843,7 +5843,7 @@
           <a:p>
             <a:fld id="{29724674-2547-4321-A0AF-0F5B55AD8D3B}" type="datetimeFigureOut">
               <a:rPr lang="en-US" smtClean="0"/>
-              <a:t>7/5/2019</a:t>
+              <a:t>7/6/2019</a:t>
             </a:fld>
             <a:endParaRPr lang="en-US"/>
           </a:p>
@@ -10048,17 +10048,23 @@
           <a:p>
             <a:r>
               <a:rPr lang="en-US" dirty="0"/>
-              <a:t>GDP for each state has gone up over time.</a:t>
-            </a:r>
-          </a:p>
-          <a:p>
+              <a:t>The market cap of S&amp;P 500 companies has seen an increase which signifies a healthy economy.</a:t>
+            </a:r>
+          </a:p>
+          <a:p>
+            <a:br>
+              <a:rPr lang="en-US" dirty="0"/>
+            </a:br>
+            <a:r>
+              <a:rPr lang="en-US" dirty="0"/>
+              <a:t>But aren’t employees more expensive now? FALSE.</a:t>
+            </a:r>
+          </a:p>
+          <a:p>
+            <a:br>
+              <a:rPr lang="en-US"/>
+            </a:br>
             <a:endParaRPr lang="en-US" dirty="0"/>
-          </a:p>
-          <a:p>
-            <a:r>
-              <a:rPr lang="en-US" dirty="0"/>
-              <a:t>But aren’t employees more expensive now? NO.</a:t>
-            </a:r>
           </a:p>
         </p:txBody>
       </p:sp>
@@ -14694,7 +14700,7 @@
         </p:nvSpPr>
         <p:spPr>
           <a:xfrm>
-            <a:off x="9633456" y="4236438"/>
+            <a:off x="9633456" y="4417552"/>
             <a:ext cx="2198945" cy="276999"/>
           </a:xfrm>
           <a:prstGeom prst="rect">
@@ -14732,7 +14738,7 @@
         </p:nvSpPr>
         <p:spPr>
           <a:xfrm>
-            <a:off x="9947794" y="4437138"/>
+            <a:off x="9949068" y="4236153"/>
             <a:ext cx="1884607" cy="276999"/>
           </a:xfrm>
           <a:prstGeom prst="rect">
@@ -14770,7 +14776,7 @@
         </p:nvSpPr>
         <p:spPr>
           <a:xfrm>
-            <a:off x="4458277" y="4437139"/>
+            <a:off x="4554765" y="4225426"/>
             <a:ext cx="1884607" cy="276999"/>
           </a:xfrm>
           <a:prstGeom prst="rect">
@@ -14789,44 +14795,6 @@
                 <a:hlinkClick r:id="rId5"/>
               </a:rPr>
               <a:t>https://fred.stlouisfed.org/</a:t>
-            </a:r>
-            <a:endParaRPr lang="en-US" sz="1200" dirty="0"/>
-          </a:p>
-        </p:txBody>
-      </p:sp>
-      <p:sp>
-        <p:nvSpPr>
-          <p:cNvPr id="11" name="TextBox 10">
-            <a:extLst>
-              <a:ext uri="{FF2B5EF4-FFF2-40B4-BE49-F238E27FC236}">
-                <a16:creationId xmlns:a16="http://schemas.microsoft.com/office/drawing/2014/main" id="{38B7ACBF-60D4-4A22-950D-DA00A7CA8464}"/>
-              </a:ext>
-            </a:extLst>
-          </p:cNvPr>
-          <p:cNvSpPr txBox="1"/>
-          <p:nvPr/>
-        </p:nvSpPr>
-        <p:spPr>
-          <a:xfrm>
-            <a:off x="4129057" y="4236438"/>
-            <a:ext cx="2198945" cy="276999"/>
-          </a:xfrm>
-          <a:prstGeom prst="rect">
-            <a:avLst/>
-          </a:prstGeom>
-          <a:noFill/>
-        </p:spPr>
-        <p:txBody>
-          <a:bodyPr wrap="square" rtlCol="0">
-            <a:spAutoFit/>
-          </a:bodyPr>
-          <a:lstStyle/>
-          <a:p>
-            <a:r>
-              <a:rPr lang="en-US" sz="1200" dirty="0">
-                <a:hlinkClick r:id="rId4"/>
-              </a:rPr>
-              <a:t>https://statusofwomendata.org/</a:t>
             </a:r>
             <a:endParaRPr lang="en-US" sz="1200" dirty="0"/>
           </a:p>

</xml_diff>